<commit_message>
Added some documents and added starting site
- Added some status reports and other documentation
- Added base django with connection to mongoDB with djongo
- Added a readme for how to start the app
</commit_message>
<xml_diff>
--- a/Archive/Status Reports/SharkToothSoftware Status Report 03-07-2024.pptx
+++ b/Archive/Status Reports/SharkToothSoftware Status Report 03-07-2024.pptx
@@ -9,8 +9,9 @@
     <p:sldId id="281" r:id="rId6"/>
     <p:sldId id="279" r:id="rId7"/>
     <p:sldId id="284" r:id="rId8"/>
-    <p:sldId id="283" r:id="rId9"/>
-    <p:sldId id="282" r:id="rId10"/>
+    <p:sldId id="285" r:id="rId9"/>
+    <p:sldId id="283" r:id="rId10"/>
+    <p:sldId id="282" r:id="rId11"/>
   </p:sldIdLst>
   <p:sldSz cx="12192000" cy="6858000"/>
   <p:notesSz cx="6858000" cy="9144000"/>
@@ -137,11 +138,7 @@
 <file path=ppt/revisionInfo.xml><?xml version="1.0" encoding="utf-8"?>
 <p1510:revInfo xmlns:a="http://schemas.openxmlformats.org/drawingml/2006/main" xmlns:r="http://schemas.openxmlformats.org/officeDocument/2006/relationships" xmlns:p1510="http://schemas.microsoft.com/office/powerpoint/2015/10/main">
   <p1510:revLst>
-    <p1510:client id="{0C428C13-5E1C-41FD-BF6E-A9FE1999AD9E}" v="647" dt="2024-03-01T04:27:31.723"/>
-    <p1510:client id="{3537FA97-C4CD-A0F8-85A1-CF64204DFB88}" v="110" dt="2024-03-01T03:55:39.180"/>
-    <p1510:client id="{3F650F9B-A2F7-5945-1DA6-574F032966DE}" v="126" dt="2024-03-01T04:16:33.332"/>
-    <p1510:client id="{892DBD82-4579-BE86-A959-2AFFCC02D42A}" v="121" dt="2024-03-01T04:27:01.847"/>
-    <p1510:client id="{A1D0F8B9-47B3-F6EB-81F0-48459006A65D}" v="92" dt="2024-03-01T03:35:05.531"/>
+    <p1510:client id="{A0CEA542-57E6-4805-922A-04E1CA69ABC2}" v="253" dt="2024-03-08T04:27:03.737"/>
   </p1510:revLst>
 </p1510:revInfo>
 </file>
@@ -4051,7 +4048,7 @@
           <p:nvPr>
             <p:extLst>
               <p:ext uri="{D42A27DB-BD31-4B8C-83A1-F6EECF244321}">
-                <p14:modId xmlns:p14="http://schemas.microsoft.com/office/powerpoint/2010/main" val="3951201673"/>
+                <p14:modId xmlns:p14="http://schemas.microsoft.com/office/powerpoint/2010/main" val="3680791735"/>
               </p:ext>
             </p:extLst>
           </p:nvPr>
@@ -4934,7 +4931,10 @@
                     <a:bodyPr/>
                     <a:lstStyle/>
                     <a:p>
-                      <a:endParaRPr lang="en-US"/>
+                      <a:r>
+                        <a:rPr lang="en-US" dirty="0"/>
+                        <a:t>1</a:t>
+                      </a:r>
                     </a:p>
                   </a:txBody>
                   <a:tcPr>
@@ -4982,7 +4982,7 @@
                     <a:bodyPr/>
                     <a:lstStyle/>
                     <a:p>
-                      <a:endParaRPr lang="en-US"/>
+                      <a:endParaRPr lang="en-US" dirty="0"/>
                     </a:p>
                   </a:txBody>
                   <a:tcPr>
@@ -5443,7 +5443,10 @@
                     <a:bodyPr/>
                     <a:lstStyle/>
                     <a:p>
-                      <a:endParaRPr lang="en-US"/>
+                      <a:r>
+                        <a:rPr lang="en-US" dirty="0"/>
+                        <a:t>10%</a:t>
+                      </a:r>
                     </a:p>
                   </a:txBody>
                   <a:tcPr>
@@ -5901,12 +5904,12 @@
                     <a:lstStyle/>
                     <a:p>
                       <a:r>
-                        <a:rPr lang="en-US"/>
+                        <a:rPr lang="en-US" dirty="0"/>
                         <a:t>N/A</a:t>
                       </a:r>
                     </a:p>
                     <a:p>
-                      <a:endParaRPr lang="en-US"/>
+                      <a:endParaRPr lang="en-US" dirty="0"/>
                     </a:p>
                   </a:txBody>
                   <a:tcPr>
@@ -5954,7 +5957,30 @@
                     <a:bodyPr/>
                     <a:lstStyle/>
                     <a:p>
-                      <a:endParaRPr lang="en-US"/>
+                      <a:pPr marL="0" marR="0" lvl="0" indent="0" algn="l" defTabSz="914400" rtl="0" eaLnBrk="1" fontAlgn="auto" latinLnBrk="0" hangingPunct="1">
+                        <a:lnSpc>
+                          <a:spcPct val="100000"/>
+                        </a:lnSpc>
+                        <a:spcBef>
+                          <a:spcPts val="0"/>
+                        </a:spcBef>
+                        <a:spcAft>
+                          <a:spcPts val="0"/>
+                        </a:spcAft>
+                        <a:buClrTx/>
+                        <a:buSzTx/>
+                        <a:buFontTx/>
+                        <a:buNone/>
+                        <a:tabLst/>
+                        <a:defRPr/>
+                      </a:pPr>
+                      <a:r>
+                        <a:rPr lang="en-US" dirty="0"/>
+                        <a:t>N/A</a:t>
+                      </a:r>
+                    </a:p>
+                    <a:p>
+                      <a:endParaRPr lang="en-US" dirty="0"/>
                     </a:p>
                   </a:txBody>
                   <a:tcPr>
@@ -6465,7 +6491,30 @@
                     <a:bodyPr/>
                     <a:lstStyle/>
                     <a:p>
-                      <a:endParaRPr lang="en-US"/>
+                      <a:pPr marL="0" marR="0" lvl="0" indent="0" algn="l" defTabSz="914400" rtl="0" eaLnBrk="1" fontAlgn="auto" latinLnBrk="0" hangingPunct="1">
+                        <a:lnSpc>
+                          <a:spcPct val="100000"/>
+                        </a:lnSpc>
+                        <a:spcBef>
+                          <a:spcPts val="0"/>
+                        </a:spcBef>
+                        <a:spcAft>
+                          <a:spcPts val="0"/>
+                        </a:spcAft>
+                        <a:buClrTx/>
+                        <a:buSzTx/>
+                        <a:buFontTx/>
+                        <a:buNone/>
+                        <a:tabLst/>
+                        <a:defRPr/>
+                      </a:pPr>
+                      <a:r>
+                        <a:rPr lang="en-US" dirty="0"/>
+                        <a:t>N/A</a:t>
+                      </a:r>
+                    </a:p>
+                    <a:p>
+                      <a:endParaRPr lang="en-US" dirty="0"/>
                     </a:p>
                   </a:txBody>
                   <a:tcPr>
@@ -6970,7 +7019,30 @@
                     <a:bodyPr/>
                     <a:lstStyle/>
                     <a:p>
-                      <a:endParaRPr lang="en-US"/>
+                      <a:pPr marL="0" marR="0" lvl="0" indent="0" algn="l" defTabSz="914400" rtl="0" eaLnBrk="1" fontAlgn="auto" latinLnBrk="0" hangingPunct="1">
+                        <a:lnSpc>
+                          <a:spcPct val="100000"/>
+                        </a:lnSpc>
+                        <a:spcBef>
+                          <a:spcPts val="0"/>
+                        </a:spcBef>
+                        <a:spcAft>
+                          <a:spcPts val="0"/>
+                        </a:spcAft>
+                        <a:buClrTx/>
+                        <a:buSzTx/>
+                        <a:buFontTx/>
+                        <a:buNone/>
+                        <a:tabLst/>
+                        <a:defRPr/>
+                      </a:pPr>
+                      <a:r>
+                        <a:rPr lang="en-US" dirty="0"/>
+                        <a:t>N/A</a:t>
+                      </a:r>
+                    </a:p>
+                    <a:p>
+                      <a:endParaRPr lang="en-US" dirty="0"/>
                     </a:p>
                   </a:txBody>
                   <a:tcPr>
@@ -7472,7 +7544,30 @@
                     <a:bodyPr/>
                     <a:lstStyle/>
                     <a:p>
-                      <a:endParaRPr lang="en-US"/>
+                      <a:pPr marL="0" marR="0" lvl="0" indent="0" algn="l" defTabSz="914400" rtl="0" eaLnBrk="1" fontAlgn="auto" latinLnBrk="0" hangingPunct="1">
+                        <a:lnSpc>
+                          <a:spcPct val="100000"/>
+                        </a:lnSpc>
+                        <a:spcBef>
+                          <a:spcPts val="0"/>
+                        </a:spcBef>
+                        <a:spcAft>
+                          <a:spcPts val="0"/>
+                        </a:spcAft>
+                        <a:buClrTx/>
+                        <a:buSzTx/>
+                        <a:buFontTx/>
+                        <a:buNone/>
+                        <a:tabLst/>
+                        <a:defRPr/>
+                      </a:pPr>
+                      <a:r>
+                        <a:rPr lang="en-US" dirty="0"/>
+                        <a:t>N/A</a:t>
+                      </a:r>
+                    </a:p>
+                    <a:p>
+                      <a:endParaRPr lang="en-US" dirty="0"/>
                     </a:p>
                   </a:txBody>
                   <a:tcPr>
@@ -7974,7 +8069,10 @@
                     <a:bodyPr/>
                     <a:lstStyle/>
                     <a:p>
-                      <a:endParaRPr lang="en-US"/>
+                      <a:r>
+                        <a:rPr lang="en-US" dirty="0"/>
+                        <a:t>5%</a:t>
+                      </a:r>
                     </a:p>
                   </a:txBody>
                   <a:tcPr>
@@ -8214,7 +8312,7 @@
                     <a:bodyPr/>
                     <a:lstStyle/>
                     <a:p>
-                      <a:endParaRPr lang="en-US"/>
+                      <a:endParaRPr lang="en-US" dirty="0"/>
                     </a:p>
                   </a:txBody>
                   <a:tcPr>
@@ -8403,6 +8501,100 @@
           </a:extLst>
         </p:spPr>
       </p:pic>
+      <p:pic>
+        <p:nvPicPr>
+          <p:cNvPr id="1028" name="Picture 4">
+            <a:extLst>
+              <a:ext uri="{FF2B5EF4-FFF2-40B4-BE49-F238E27FC236}">
+                <a16:creationId xmlns:a16="http://schemas.microsoft.com/office/drawing/2014/main" id="{D336A484-6F7A-B916-5CB2-7D8901086804}"/>
+              </a:ext>
+            </a:extLst>
+          </p:cNvPr>
+          <p:cNvPicPr>
+            <a:picLocks noChangeAspect="1" noChangeArrowheads="1"/>
+          </p:cNvPicPr>
+          <p:nvPr/>
+        </p:nvPicPr>
+        <p:blipFill>
+          <a:blip r:embed="rId4">
+            <a:extLst>
+              <a:ext uri="{28A0092B-C50C-407E-A947-70E740481C1C}">
+                <a14:useLocalDpi xmlns:a14="http://schemas.microsoft.com/office/drawing/2010/main" val="0"/>
+              </a:ext>
+            </a:extLst>
+          </a:blip>
+          <a:srcRect/>
+          <a:stretch>
+            <a:fillRect/>
+          </a:stretch>
+        </p:blipFill>
+        <p:spPr bwMode="auto">
+          <a:xfrm>
+            <a:off x="0" y="1479550"/>
+            <a:ext cx="12192000" cy="3897313"/>
+          </a:xfrm>
+          <a:prstGeom prst="rect">
+            <a:avLst/>
+          </a:prstGeom>
+          <a:noFill/>
+          <a:extLst>
+            <a:ext uri="{909E8E84-426E-40DD-AFC4-6F175D3DCCD1}">
+              <a14:hiddenFill xmlns:a14="http://schemas.microsoft.com/office/drawing/2010/main">
+                <a:solidFill>
+                  <a:srgbClr val="FFFFFF"/>
+                </a:solidFill>
+              </a14:hiddenFill>
+            </a:ext>
+          </a:extLst>
+        </p:spPr>
+      </p:pic>
+      <p:pic>
+        <p:nvPicPr>
+          <p:cNvPr id="1030" name="Picture 6">
+            <a:extLst>
+              <a:ext uri="{FF2B5EF4-FFF2-40B4-BE49-F238E27FC236}">
+                <a16:creationId xmlns:a16="http://schemas.microsoft.com/office/drawing/2014/main" id="{67C4ABAD-0F10-FC6B-A2A0-CE6DA55DFDC8}"/>
+              </a:ext>
+            </a:extLst>
+          </p:cNvPr>
+          <p:cNvPicPr>
+            <a:picLocks noChangeAspect="1" noChangeArrowheads="1"/>
+          </p:cNvPicPr>
+          <p:nvPr/>
+        </p:nvPicPr>
+        <p:blipFill>
+          <a:blip r:embed="rId5">
+            <a:extLst>
+              <a:ext uri="{28A0092B-C50C-407E-A947-70E740481C1C}">
+                <a14:useLocalDpi xmlns:a14="http://schemas.microsoft.com/office/drawing/2010/main" val="0"/>
+              </a:ext>
+            </a:extLst>
+          </a:blip>
+          <a:srcRect/>
+          <a:stretch>
+            <a:fillRect/>
+          </a:stretch>
+        </p:blipFill>
+        <p:spPr bwMode="auto">
+          <a:xfrm>
+            <a:off x="0" y="1393825"/>
+            <a:ext cx="12192000" cy="4068763"/>
+          </a:xfrm>
+          <a:prstGeom prst="rect">
+            <a:avLst/>
+          </a:prstGeom>
+          <a:noFill/>
+          <a:extLst>
+            <a:ext uri="{909E8E84-426E-40DD-AFC4-6F175D3DCCD1}">
+              <a14:hiddenFill xmlns:a14="http://schemas.microsoft.com/office/drawing/2010/main">
+                <a:solidFill>
+                  <a:srgbClr val="FFFFFF"/>
+                </a:solidFill>
+              </a14:hiddenFill>
+            </a:ext>
+          </a:extLst>
+        </p:spPr>
+      </p:pic>
     </p:spTree>
     <p:extLst>
       <p:ext uri="{BB962C8B-B14F-4D97-AF65-F5344CB8AC3E}">
@@ -8460,12 +8652,59 @@
           <a:lstStyle/>
           <a:p>
             <a:r>
-              <a:rPr lang="en-US"/>
-              <a:t>Overall Requirements Table (Work in Progress)</a:t>
+              <a:rPr lang="en-US" dirty="0"/>
+              <a:t>Use Case Diagram</a:t>
             </a:r>
           </a:p>
         </p:txBody>
       </p:sp>
+      <p:pic>
+        <p:nvPicPr>
+          <p:cNvPr id="2050" name="Picture 2">
+            <a:extLst>
+              <a:ext uri="{FF2B5EF4-FFF2-40B4-BE49-F238E27FC236}">
+                <a16:creationId xmlns:a16="http://schemas.microsoft.com/office/drawing/2014/main" id="{266C0D22-5D52-A06A-72F7-BC91B89F2C8D}"/>
+              </a:ext>
+            </a:extLst>
+          </p:cNvPr>
+          <p:cNvPicPr>
+            <a:picLocks noChangeAspect="1" noChangeArrowheads="1"/>
+          </p:cNvPicPr>
+          <p:nvPr/>
+        </p:nvPicPr>
+        <p:blipFill>
+          <a:blip r:embed="rId2">
+            <a:extLst>
+              <a:ext uri="{28A0092B-C50C-407E-A947-70E740481C1C}">
+                <a14:useLocalDpi xmlns:a14="http://schemas.microsoft.com/office/drawing/2010/main" val="0"/>
+              </a:ext>
+            </a:extLst>
+          </a:blip>
+          <a:srcRect/>
+          <a:stretch>
+            <a:fillRect/>
+          </a:stretch>
+        </p:blipFill>
+        <p:spPr bwMode="auto">
+          <a:xfrm>
+            <a:off x="644844" y="1705065"/>
+            <a:ext cx="6629400" cy="4371975"/>
+          </a:xfrm>
+          <a:prstGeom prst="rect">
+            <a:avLst/>
+          </a:prstGeom>
+          <a:noFill/>
+          <a:extLst>
+            <a:ext uri="{909E8E84-426E-40DD-AFC4-6F175D3DCCD1}">
+              <a14:hiddenFill xmlns:a14="http://schemas.microsoft.com/office/drawing/2010/main">
+                <a:solidFill>
+                  <a:srgbClr val="FFFFFF"/>
+                </a:solidFill>
+              </a14:hiddenFill>
+            </a:ext>
+          </a:extLst>
+        </p:spPr>
+      </p:pic>
     </p:spTree>
     <p:extLst>
       <p:ext uri="{BB962C8B-B14F-4D97-AF65-F5344CB8AC3E}">
@@ -8480,6 +8719,131 @@
 </file>
 
 <file path=ppt/slides/slide5.xml><?xml version="1.0" encoding="utf-8"?>
+<p:sld xmlns:a="http://schemas.openxmlformats.org/drawingml/2006/main" xmlns:r="http://schemas.openxmlformats.org/officeDocument/2006/relationships" xmlns:p="http://schemas.openxmlformats.org/presentationml/2006/main">
+  <p:cSld>
+    <p:spTree>
+      <p:nvGrpSpPr>
+        <p:cNvPr id="1" name=""/>
+        <p:cNvGrpSpPr/>
+        <p:nvPr/>
+      </p:nvGrpSpPr>
+      <p:grpSpPr>
+        <a:xfrm>
+          <a:off x="0" y="0"/>
+          <a:ext cx="0" cy="0"/>
+          <a:chOff x="0" y="0"/>
+          <a:chExt cx="0" cy="0"/>
+        </a:xfrm>
+      </p:grpSpPr>
+      <p:pic>
+        <p:nvPicPr>
+          <p:cNvPr id="5" name="Picture 4">
+            <a:extLst>
+              <a:ext uri="{FF2B5EF4-FFF2-40B4-BE49-F238E27FC236}">
+                <a16:creationId xmlns:a16="http://schemas.microsoft.com/office/drawing/2014/main" id="{6A32416B-8B69-308A-7B13-2160CDDB157B}"/>
+              </a:ext>
+            </a:extLst>
+          </p:cNvPr>
+          <p:cNvPicPr>
+            <a:picLocks noChangeAspect="1"/>
+          </p:cNvPicPr>
+          <p:nvPr/>
+        </p:nvPicPr>
+        <p:blipFill>
+          <a:blip r:embed="rId2"/>
+          <a:stretch>
+            <a:fillRect/>
+          </a:stretch>
+        </p:blipFill>
+        <p:spPr>
+          <a:xfrm>
+            <a:off x="260957" y="0"/>
+            <a:ext cx="5111632" cy="6858000"/>
+          </a:xfrm>
+          <a:prstGeom prst="rect">
+            <a:avLst/>
+          </a:prstGeom>
+        </p:spPr>
+      </p:pic>
+      <p:pic>
+        <p:nvPicPr>
+          <p:cNvPr id="7" name="Picture 6">
+            <a:extLst>
+              <a:ext uri="{FF2B5EF4-FFF2-40B4-BE49-F238E27FC236}">
+                <a16:creationId xmlns:a16="http://schemas.microsoft.com/office/drawing/2014/main" id="{603AF43D-3573-26DE-475A-A274A0EAE7C3}"/>
+              </a:ext>
+            </a:extLst>
+          </p:cNvPr>
+          <p:cNvPicPr>
+            <a:picLocks noChangeAspect="1"/>
+          </p:cNvPicPr>
+          <p:nvPr/>
+        </p:nvPicPr>
+        <p:blipFill>
+          <a:blip r:embed="rId3"/>
+          <a:stretch>
+            <a:fillRect/>
+          </a:stretch>
+        </p:blipFill>
+        <p:spPr>
+          <a:xfrm>
+            <a:off x="5372589" y="798884"/>
+            <a:ext cx="6238621" cy="1960082"/>
+          </a:xfrm>
+          <a:prstGeom prst="rect">
+            <a:avLst/>
+          </a:prstGeom>
+        </p:spPr>
+      </p:pic>
+      <p:sp>
+        <p:nvSpPr>
+          <p:cNvPr id="8" name="TextBox 7">
+            <a:extLst>
+              <a:ext uri="{FF2B5EF4-FFF2-40B4-BE49-F238E27FC236}">
+                <a16:creationId xmlns:a16="http://schemas.microsoft.com/office/drawing/2014/main" id="{0614E8B2-FCFC-1276-80DC-3F33ED91C459}"/>
+              </a:ext>
+            </a:extLst>
+          </p:cNvPr>
+          <p:cNvSpPr txBox="1"/>
+          <p:nvPr/>
+        </p:nvSpPr>
+        <p:spPr>
+          <a:xfrm>
+            <a:off x="7482906" y="-32113"/>
+            <a:ext cx="3229763" cy="830997"/>
+          </a:xfrm>
+          <a:prstGeom prst="rect">
+            <a:avLst/>
+          </a:prstGeom>
+          <a:noFill/>
+        </p:spPr>
+        <p:txBody>
+          <a:bodyPr wrap="square" rtlCol="0">
+            <a:spAutoFit/>
+          </a:bodyPr>
+          <a:lstStyle/>
+          <a:p>
+            <a:r>
+              <a:rPr lang="en-US" sz="4800" dirty="0"/>
+              <a:t>User Stories</a:t>
+            </a:r>
+          </a:p>
+        </p:txBody>
+      </p:sp>
+    </p:spTree>
+    <p:extLst>
+      <p:ext uri="{BB962C8B-B14F-4D97-AF65-F5344CB8AC3E}">
+        <p14:creationId xmlns:p14="http://schemas.microsoft.com/office/powerpoint/2010/main" val="2127279132"/>
+      </p:ext>
+    </p:extLst>
+  </p:cSld>
+  <p:clrMapOvr>
+    <a:masterClrMapping/>
+  </p:clrMapOvr>
+</p:sld>
+</file>
+
+<file path=ppt/slides/slide6.xml><?xml version="1.0" encoding="utf-8"?>
 <p:sld xmlns:a="http://schemas.openxmlformats.org/drawingml/2006/main" xmlns:r="http://schemas.openxmlformats.org/officeDocument/2006/relationships" xmlns:p="http://schemas.openxmlformats.org/presentationml/2006/main">
   <p:cSld>
     <p:spTree>
@@ -8512,7 +8876,12 @@
             <p:ph type="title"/>
           </p:nvPr>
         </p:nvSpPr>
-        <p:spPr/>
+        <p:spPr>
+          <a:xfrm>
+            <a:off x="838200" y="-147255"/>
+            <a:ext cx="10515600" cy="1325563"/>
+          </a:xfrm>
+        </p:spPr>
         <p:txBody>
           <a:bodyPr/>
           <a:lstStyle/>
@@ -8527,10 +8896,10 @@
       </p:sp>
       <p:pic>
         <p:nvPicPr>
-          <p:cNvPr id="7" name="Picture 6">
+          <p:cNvPr id="4" name="Picture 3">
             <a:extLst>
               <a:ext uri="{FF2B5EF4-FFF2-40B4-BE49-F238E27FC236}">
-                <a16:creationId xmlns:a16="http://schemas.microsoft.com/office/drawing/2014/main" id="{1C65A7BB-A110-40BC-4954-AB24E84B9F02}"/>
+                <a16:creationId xmlns:a16="http://schemas.microsoft.com/office/drawing/2014/main" id="{6A2347EE-BC1D-9B44-B3A8-A0D590393964}"/>
               </a:ext>
             </a:extLst>
           </p:cNvPr>
@@ -8547,8 +8916,8 @@
         </p:blipFill>
         <p:spPr>
           <a:xfrm>
-            <a:off x="1375115" y="1345095"/>
-            <a:ext cx="9339268" cy="4741475"/>
+            <a:off x="921233" y="809271"/>
+            <a:ext cx="10004272" cy="6048729"/>
           </a:xfrm>
           <a:prstGeom prst="rect">
             <a:avLst/>
@@ -8568,7 +8937,7 @@
 </p:sld>
 </file>
 
-<file path=ppt/slides/slide6.xml><?xml version="1.0" encoding="utf-8"?>
+<file path=ppt/slides/slide7.xml><?xml version="1.0" encoding="utf-8"?>
 <p:sld xmlns:a="http://schemas.openxmlformats.org/drawingml/2006/main" xmlns:r="http://schemas.openxmlformats.org/officeDocument/2006/relationships" xmlns:p="http://schemas.openxmlformats.org/presentationml/2006/main">
   <p:cSld>
     <p:spTree>
@@ -8612,7 +8981,7 @@
           <a:lstStyle/>
           <a:p>
             <a:r>
-              <a:rPr lang="en-US"/>
+              <a:rPr lang="en-US" dirty="0"/>
               <a:t>What Everyone is Working on - week 2/29/2024</a:t>
             </a:r>
           </a:p>
@@ -8684,19 +9053,18 @@
               <a:rPr lang="en-US" dirty="0"/>
               <a:t>Working on updating Gantt Chart</a:t>
             </a:r>
-            <a:endParaRPr lang="en-US" dirty="0">
-              <a:ea typeface="Calibri"/>
-              <a:cs typeface="Calibri"/>
-            </a:endParaRPr>
-          </a:p>
-          <a:p>
-            <a:pPr lvl="1"/>
+            <a:r>
+              <a:rPr lang="en-US" dirty="0">
+                <a:cs typeface="Calibri"/>
+              </a:rPr>
+              <a:t>, </a:t>
+            </a:r>
             <a:r>
               <a:rPr lang="en-US" dirty="0">
                 <a:ea typeface="Calibri"/>
                 <a:cs typeface="Calibri"/>
               </a:rPr>
-              <a:t>Working on updating CPI, RCM, SCM</a:t>
+              <a:t>CPI, RCM, SCM</a:t>
             </a:r>
           </a:p>
           <a:p>
@@ -8706,7 +9074,7 @@
                 <a:ea typeface="Calibri"/>
                 <a:cs typeface="Calibri"/>
               </a:rPr>
-              <a:t>Project Management</a:t>
+              <a:t>Researching Architecture Options</a:t>
             </a:r>
           </a:p>
           <a:p>
@@ -8728,6 +9096,16 @@
                 <a:cs typeface="Calibri"/>
               </a:rPr>
               <a:t>Creating class models</a:t>
+            </a:r>
+          </a:p>
+          <a:p>
+            <a:pPr lvl="1"/>
+            <a:r>
+              <a:rPr lang="en-US" dirty="0">
+                <a:ea typeface="Calibri"/>
+                <a:cs typeface="Calibri"/>
+              </a:rPr>
+              <a:t>Class Diagrams</a:t>
             </a:r>
           </a:p>
         </p:txBody>
@@ -8932,10 +9310,9 @@
           <a:p>
             <a:pPr lvl="1"/>
             <a:r>
-              <a:rPr lang="en-US"/>
-              <a:t>Placeholder</a:t>
-            </a:r>
-            <a:endParaRPr lang="en-US" dirty="0"/>
+              <a:rPr lang="en-US" dirty="0"/>
+              <a:t>Fleshing out the requirements</a:t>
+            </a:r>
           </a:p>
           <a:p>
             <a:r>
@@ -9563,15 +9940,15 @@
 <file path=customXml/itemProps3.xml><?xml version="1.0" encoding="utf-8"?>
 <ds:datastoreItem xmlns:ds="http://schemas.openxmlformats.org/officeDocument/2006/customXml" ds:itemID="{68879C50-9B21-4BFE-84EA-33BC1F2B4179}">
   <ds:schemaRefs>
-    <ds:schemaRef ds:uri="563757dc-21ec-4026-8860-76aaf78db67e"/>
+    <ds:schemaRef ds:uri="http://schemas.microsoft.com/office/2006/metadata/properties"/>
+    <ds:schemaRef ds:uri="http://purl.org/dc/terms/"/>
+    <ds:schemaRef ds:uri="http://schemas.microsoft.com/office/2006/documentManagement/types"/>
+    <ds:schemaRef ds:uri="http://purl.org/dc/elements/1.1/"/>
     <ds:schemaRef ds:uri="c5bce405-8758-4dc6-98d6-2b6a48b3b830"/>
     <ds:schemaRef ds:uri="http://purl.org/dc/dcmitype/"/>
-    <ds:schemaRef ds:uri="http://purl.org/dc/elements/1.1/"/>
-    <ds:schemaRef ds:uri="http://purl.org/dc/terms/"/>
-    <ds:schemaRef ds:uri="http://schemas.microsoft.com/office/2006/documentManagement/types"/>
-    <ds:schemaRef ds:uri="http://schemas.microsoft.com/office/2006/metadata/properties"/>
     <ds:schemaRef ds:uri="http://schemas.microsoft.com/office/infopath/2007/PartnerControls"/>
     <ds:schemaRef ds:uri="http://schemas.openxmlformats.org/package/2006/metadata/core-properties"/>
+    <ds:schemaRef ds:uri="563757dc-21ec-4026-8860-76aaf78db67e"/>
     <ds:schemaRef ds:uri="http://www.w3.org/XML/1998/namespace"/>
   </ds:schemaRefs>
 </ds:datastoreItem>

</xml_diff>